<commit_message>
Added URL for session materials
</commit_message>
<xml_diff>
--- a/Hennig_PowerShell.pptx
+++ b/Hennig_PowerShell.pptx
@@ -7934,6 +7934,25 @@
               <a:rPr lang="en-CA" dirty="0"/>
               <a:t>Tons of resources available</a:t>
             </a:r>
+          </a:p>
+          <a:p>
+            <a:pPr eaLnBrk="1" hangingPunct="1">
+              <a:defRPr/>
+            </a:pPr>
+            <a:r>
+              <a:rPr lang="en-CA" dirty="0"/>
+              <a:t>Session materials </a:t>
+            </a:r>
+            <a:r>
+              <a:rPr lang="en-CA"/>
+              <a:t>at </a:t>
+            </a:r>
+            <a:r>
+              <a:rPr lang="en-CA">
+                <a:hlinkClick r:id="rId2"/>
+              </a:rPr>
+              <a:t>https://github.com/DougHennig/PowerShell</a:t>
+            </a:r>
             <a:endParaRPr lang="en-US" dirty="0"/>
           </a:p>
           <a:p>
@@ -9934,24 +9953,6 @@
 </file>
 
 <file path=customXml/item1.xml><?xml version="1.0" encoding="utf-8"?>
-<Control xmlns="http://schemas.microsoft.com/VisualStudio/2011/storyboarding/control">
-  <Id Name="3a5f3215-4f7c-4247-9247-a9acf7619a8c" Revision="1" Stencil="System.MyShapes" StencilVersion="1.0"/>
-</Control>
-</file>
-
-<file path=customXml/item10.xml><?xml version="1.0" encoding="utf-8"?>
-<Control xmlns="http://schemas.microsoft.com/VisualStudio/2011/storyboarding/control">
-  <Id Name="37d07999-8e88-45a7-b776-aa394cd3ee89" Revision="1" Stencil="System.MyShapes" StencilVersion="1.0"/>
-</Control>
-</file>
-
-<file path=customXml/item11.xml><?xml version="1.0" encoding="utf-8"?>
-<Control xmlns="http://schemas.microsoft.com/VisualStudio/2011/storyboarding/control">
-  <Id Name="37d07999-8e88-45a7-b776-aa394cd3ee89" Revision="1" Stencil="System.MyShapes" StencilVersion="1.0"/>
-</Control>
-</file>
-
-<file path=customXml/item2.xml><?xml version="1.0" encoding="utf-8"?>
 <p:properties xmlns:p="http://schemas.microsoft.com/office/2006/metadata/properties" xmlns:xsi="http://www.w3.org/2001/XMLSchema-instance" xmlns:pc="http://schemas.microsoft.com/office/infopath/2007/PartnerControls">
   <documentManagement>
     <LocPublishedLinkedAssetsLookup xmlns="4873beb7-5857-4685-be1f-d57550cc96cc" xsi:nil="true"/>
@@ -10087,25 +10088,25 @@
 </p:properties>
 </file>
 
-<file path=customXml/item3.xml><?xml version="1.0" encoding="utf-8"?>
+<file path=customXml/item10.xml><?xml version="1.0" encoding="utf-8"?>
 <Control xmlns="http://schemas.microsoft.com/VisualStudio/2011/storyboarding/control">
   <Id Name="37d07999-8e88-45a7-b776-aa394cd3ee89" Revision="1" Stencil="System.MyShapes" StencilVersion="1.0"/>
 </Control>
 </file>
 
-<file path=customXml/item4.xml><?xml version="1.0" encoding="utf-8"?>
-<Control xmlns="http://schemas.microsoft.com/VisualStudio/2011/storyboarding/control">
-  <Id Name="37d07999-8e88-45a7-b776-aa394cd3ee89" Revision="1" Stencil="System.MyShapes" StencilVersion="1.0"/>
-</Control>
-</file>
-
-<file path=customXml/item5.xml><?xml version="1.0" encoding="utf-8"?>
+<file path=customXml/item11.xml><?xml version="1.0" encoding="utf-8"?>
 <Control xmlns="http://schemas.microsoft.com/VisualStudio/2011/storyboarding/control">
   <Id Name="3a5f3215-4f7c-4247-9247-a9acf7619a8c" Revision="1" Stencil="System.MyShapes" StencilVersion="1.0"/>
 </Control>
 </file>
 
-<file path=customXml/item6.xml><?xml version="1.0" encoding="utf-8"?>
+<file path=customXml/item2.xml><?xml version="1.0" encoding="utf-8"?>
+<Control xmlns="http://schemas.microsoft.com/VisualStudio/2011/storyboarding/control">
+  <Id Name="3a5f3215-4f7c-4247-9247-a9acf7619a8c" Revision="1" Stencil="System.MyShapes" StencilVersion="1.0"/>
+</Control>
+</file>
+
+<file path=customXml/item3.xml><?xml version="1.0" encoding="utf-8"?>
 <ct:contentTypeSchema xmlns:ct="http://schemas.microsoft.com/office/2006/metadata/contentType" xmlns:ma="http://schemas.microsoft.com/office/2006/metadata/properties/metaAttributes" ct:_="" ma:_="" ma:contentTypeName="TemplateFile" ma:contentTypeID="0x0101006EDDDB5EE6D98C44930B742096920B300400F5B6D36B3EF94B4E9A635CDF2A18F5B8" ma:contentTypeVersion="72" ma:contentTypeDescription="Create a new document." ma:contentTypeScope="" ma:versionID="a23e56308344d904b51738559c3d67c9">
   <xsd:schema xmlns:xsd="http://www.w3.org/2001/XMLSchema" xmlns:xs="http://www.w3.org/2001/XMLSchema" xmlns:p="http://schemas.microsoft.com/office/2006/metadata/properties" xmlns:ns2="4873beb7-5857-4685-be1f-d57550cc96cc" targetNamespace="http://schemas.microsoft.com/office/2006/metadata/properties" ma:root="true" ma:fieldsID="cd0908cc4600e77bf5da051303e00c8d" ns2:_="">
     <xsd:import namespace="4873beb7-5857-4685-be1f-d57550cc96cc"/>
@@ -11145,13 +11146,37 @@
 </ct:contentTypeSchema>
 </file>
 
-<file path=customXml/item7.xml><?xml version="1.0" encoding="utf-8"?>
+<file path=customXml/item4.xml><?xml version="1.0" encoding="utf-8"?>
+<Control xmlns="http://schemas.microsoft.com/VisualStudio/2011/storyboarding/control">
+  <Id Name="37d07999-8e88-45a7-b776-aa394cd3ee89" Revision="1" Stencil="System.MyShapes" StencilVersion="1.0"/>
+</Control>
+</file>
+
+<file path=customXml/item5.xml><?xml version="1.0" encoding="utf-8"?>
 <Control xmlns="http://schemas.microsoft.com/VisualStudio/2011/storyboarding/control">
   <Id Name="3a5f3215-4f7c-4247-9247-a9acf7619a8c" Revision="1" Stencil="System.MyShapes" StencilVersion="1.0"/>
 </Control>
 </file>
 
+<file path=customXml/item6.xml><?xml version="1.0" encoding="utf-8"?>
+<Control xmlns="http://schemas.microsoft.com/VisualStudio/2011/storyboarding/control">
+  <Id Name="37d07999-8e88-45a7-b776-aa394cd3ee89" Revision="1" Stencil="System.MyShapes" StencilVersion="1.0"/>
+</Control>
+</file>
+
+<file path=customXml/item7.xml><?xml version="1.0" encoding="utf-8"?>
+<Control xmlns="http://schemas.microsoft.com/VisualStudio/2011/storyboarding/control">
+  <Id Name="37d07999-8e88-45a7-b776-aa394cd3ee89" Revision="1" Stencil="System.MyShapes" StencilVersion="1.0"/>
+</Control>
+</file>
+
 <file path=customXml/item8.xml><?xml version="1.0" encoding="utf-8"?>
+<Control xmlns="http://schemas.microsoft.com/VisualStudio/2011/storyboarding/control">
+  <Id Name="3a5f3215-4f7c-4247-9247-a9acf7619a8c" Revision="1" Stencil="System.MyShapes" StencilVersion="1.0"/>
+</Control>
+</file>
+
+<file path=customXml/item9.xml><?xml version="1.0" encoding="utf-8"?>
 <?mso-contentType ?>
 <FormTemplates xmlns="http://schemas.microsoft.com/sharepoint/v3/contenttype/forms">
   <Display>DocumentLibraryForm</Display>
@@ -11160,37 +11185,7 @@
 </FormTemplates>
 </file>
 
-<file path=customXml/item9.xml><?xml version="1.0" encoding="utf-8"?>
-<Control xmlns="http://schemas.microsoft.com/VisualStudio/2011/storyboarding/control">
-  <Id Name="3a5f3215-4f7c-4247-9247-a9acf7619a8c" Revision="1" Stencil="System.MyShapes" StencilVersion="1.0"/>
-</Control>
-</file>
-
 <file path=customXml/itemProps1.xml><?xml version="1.0" encoding="utf-8"?>
-<ds:datastoreItem xmlns:ds="http://schemas.openxmlformats.org/officeDocument/2006/customXml" ds:itemID="{B93E3EFA-D9D3-4448-BC21-BB6156158366}">
-  <ds:schemaRefs>
-    <ds:schemaRef ds:uri="http://schemas.microsoft.com/VisualStudio/2011/storyboarding/control"/>
-  </ds:schemaRefs>
-</ds:datastoreItem>
-</file>
-
-<file path=customXml/itemProps10.xml><?xml version="1.0" encoding="utf-8"?>
-<ds:datastoreItem xmlns:ds="http://schemas.openxmlformats.org/officeDocument/2006/customXml" ds:itemID="{7CC5A912-861C-4DE5-A79D-195E5086349C}">
-  <ds:schemaRefs>
-    <ds:schemaRef ds:uri="http://schemas.microsoft.com/VisualStudio/2011/storyboarding/control"/>
-  </ds:schemaRefs>
-</ds:datastoreItem>
-</file>
-
-<file path=customXml/itemProps11.xml><?xml version="1.0" encoding="utf-8"?>
-<ds:datastoreItem xmlns:ds="http://schemas.openxmlformats.org/officeDocument/2006/customXml" ds:itemID="{D64DEF83-831D-41CA-B887-8B4678D84355}">
-  <ds:schemaRefs>
-    <ds:schemaRef ds:uri="http://schemas.microsoft.com/VisualStudio/2011/storyboarding/control"/>
-  </ds:schemaRefs>
-</ds:datastoreItem>
-</file>
-
-<file path=customXml/itemProps2.xml><?xml version="1.0" encoding="utf-8"?>
 <ds:datastoreItem xmlns:ds="http://schemas.openxmlformats.org/officeDocument/2006/customXml" ds:itemID="{F301D382-32B0-43EE-932C-28906AF37617}">
   <ds:schemaRefs>
     <ds:schemaRef ds:uri="http://purl.org/dc/elements/1.1/"/>
@@ -11206,7 +11201,7 @@
 </ds:datastoreItem>
 </file>
 
-<file path=customXml/itemProps3.xml><?xml version="1.0" encoding="utf-8"?>
+<file path=customXml/itemProps10.xml><?xml version="1.0" encoding="utf-8"?>
 <ds:datastoreItem xmlns:ds="http://schemas.openxmlformats.org/officeDocument/2006/customXml" ds:itemID="{9BE992AB-AC79-4CFA-8E4D-01B8E612C593}">
   <ds:schemaRefs>
     <ds:schemaRef ds:uri="http://schemas.microsoft.com/VisualStudio/2011/storyboarding/control"/>
@@ -11214,23 +11209,23 @@
 </ds:datastoreItem>
 </file>
 
-<file path=customXml/itemProps4.xml><?xml version="1.0" encoding="utf-8"?>
-<ds:datastoreItem xmlns:ds="http://schemas.openxmlformats.org/officeDocument/2006/customXml" ds:itemID="{24248713-04D9-4B55-9B64-290315285C69}">
+<file path=customXml/itemProps11.xml><?xml version="1.0" encoding="utf-8"?>
+<ds:datastoreItem xmlns:ds="http://schemas.openxmlformats.org/officeDocument/2006/customXml" ds:itemID="{3DCE84C0-C49E-43FD-B3E0-95EA30D6B555}">
   <ds:schemaRefs>
     <ds:schemaRef ds:uri="http://schemas.microsoft.com/VisualStudio/2011/storyboarding/control"/>
   </ds:schemaRefs>
 </ds:datastoreItem>
 </file>
 
-<file path=customXml/itemProps5.xml><?xml version="1.0" encoding="utf-8"?>
-<ds:datastoreItem xmlns:ds="http://schemas.openxmlformats.org/officeDocument/2006/customXml" ds:itemID="{424F15E0-202D-4292-9536-B4298F98D690}">
+<file path=customXml/itemProps2.xml><?xml version="1.0" encoding="utf-8"?>
+<ds:datastoreItem xmlns:ds="http://schemas.openxmlformats.org/officeDocument/2006/customXml" ds:itemID="{B93E3EFA-D9D3-4448-BC21-BB6156158366}">
   <ds:schemaRefs>
     <ds:schemaRef ds:uri="http://schemas.microsoft.com/VisualStudio/2011/storyboarding/control"/>
   </ds:schemaRefs>
 </ds:datastoreItem>
 </file>
 
-<file path=customXml/itemProps6.xml><?xml version="1.0" encoding="utf-8"?>
+<file path=customXml/itemProps3.xml><?xml version="1.0" encoding="utf-8"?>
 <ds:datastoreItem xmlns:ds="http://schemas.openxmlformats.org/officeDocument/2006/customXml" ds:itemID="{BBB5C329-08A6-4E5E-AEF1-A97828C87411}">
   <ds:schemaRefs>
     <ds:schemaRef ds:uri="http://schemas.microsoft.com/office/2006/metadata/contentType"/>
@@ -11248,8 +11243,32 @@
 </ds:datastoreItem>
 </file>
 
+<file path=customXml/itemProps4.xml><?xml version="1.0" encoding="utf-8"?>
+<ds:datastoreItem xmlns:ds="http://schemas.openxmlformats.org/officeDocument/2006/customXml" ds:itemID="{D64DEF83-831D-41CA-B887-8B4678D84355}">
+  <ds:schemaRefs>
+    <ds:schemaRef ds:uri="http://schemas.microsoft.com/VisualStudio/2011/storyboarding/control"/>
+  </ds:schemaRefs>
+</ds:datastoreItem>
+</file>
+
+<file path=customXml/itemProps5.xml><?xml version="1.0" encoding="utf-8"?>
+<ds:datastoreItem xmlns:ds="http://schemas.openxmlformats.org/officeDocument/2006/customXml" ds:itemID="{424F15E0-202D-4292-9536-B4298F98D690}">
+  <ds:schemaRefs>
+    <ds:schemaRef ds:uri="http://schemas.microsoft.com/VisualStudio/2011/storyboarding/control"/>
+  </ds:schemaRefs>
+</ds:datastoreItem>
+</file>
+
+<file path=customXml/itemProps6.xml><?xml version="1.0" encoding="utf-8"?>
+<ds:datastoreItem xmlns:ds="http://schemas.openxmlformats.org/officeDocument/2006/customXml" ds:itemID="{7CC5A912-861C-4DE5-A79D-195E5086349C}">
+  <ds:schemaRefs>
+    <ds:schemaRef ds:uri="http://schemas.microsoft.com/VisualStudio/2011/storyboarding/control"/>
+  </ds:schemaRefs>
+</ds:datastoreItem>
+</file>
+
 <file path=customXml/itemProps7.xml><?xml version="1.0" encoding="utf-8"?>
-<ds:datastoreItem xmlns:ds="http://schemas.openxmlformats.org/officeDocument/2006/customXml" ds:itemID="{3DCE84C0-C49E-43FD-B3E0-95EA30D6B555}">
+<ds:datastoreItem xmlns:ds="http://schemas.openxmlformats.org/officeDocument/2006/customXml" ds:itemID="{24248713-04D9-4B55-9B64-290315285C69}">
   <ds:schemaRefs>
     <ds:schemaRef ds:uri="http://schemas.microsoft.com/VisualStudio/2011/storyboarding/control"/>
   </ds:schemaRefs>
@@ -11257,17 +11276,17 @@
 </file>
 
 <file path=customXml/itemProps8.xml><?xml version="1.0" encoding="utf-8"?>
+<ds:datastoreItem xmlns:ds="http://schemas.openxmlformats.org/officeDocument/2006/customXml" ds:itemID="{F8B7C765-2F36-4486-9DE5-D0E485AFE8E4}">
+  <ds:schemaRefs>
+    <ds:schemaRef ds:uri="http://schemas.microsoft.com/VisualStudio/2011/storyboarding/control"/>
+  </ds:schemaRefs>
+</ds:datastoreItem>
+</file>
+
+<file path=customXml/itemProps9.xml><?xml version="1.0" encoding="utf-8"?>
 <ds:datastoreItem xmlns:ds="http://schemas.openxmlformats.org/officeDocument/2006/customXml" ds:itemID="{E1B558C7-619B-49BE-9097-7FCBDADD4ECE}">
   <ds:schemaRefs>
     <ds:schemaRef ds:uri="http://schemas.microsoft.com/sharepoint/v3/contenttype/forms"/>
   </ds:schemaRefs>
 </ds:datastoreItem>
-</file>
-
-<file path=customXml/itemProps9.xml><?xml version="1.0" encoding="utf-8"?>
-<ds:datastoreItem xmlns:ds="http://schemas.openxmlformats.org/officeDocument/2006/customXml" ds:itemID="{F8B7C765-2F36-4486-9DE5-D0E485AFE8E4}">
-  <ds:schemaRefs>
-    <ds:schemaRef ds:uri="http://schemas.microsoft.com/VisualStudio/2011/storyboarding/control"/>
-  </ds:schemaRefs>
-</ds:datastoreItem>
 </file>
</xml_diff>